<commit_message>
Fixing errors in the diagram
</commit_message>
<xml_diff>
--- a/doc/Presentacion.pptx
+++ b/doc/Presentacion.pptx
@@ -7563,7 +7563,7 @@
           </a:effectLst>
           <a:extLst>
             <a:ext uri="{91240B29-F687-4f45-9708-019B960494DF}">
-              <a14:hiddenLine xmlns="" xmlns:a14="http://schemas.microsoft.com/office/drawing/2010/main" xmlns:a16="http://schemas.microsoft.com/office/drawing/2014/main" xmlns:p14="http://schemas.microsoft.com/office/powerpoint/2010/main" w="9525">
+              <a14:hiddenLine xmlns:p14="http://schemas.microsoft.com/office/powerpoint/2010/main" xmlns:a16="http://schemas.microsoft.com/office/drawing/2014/main" xmlns:a14="http://schemas.microsoft.com/office/drawing/2010/main" xmlns="" w="9525">
                 <a:solidFill>
                   <a:srgbClr val="000000"/>
                 </a:solidFill>
@@ -8941,8 +8941,8 @@
           </a:prstGeom>
         </p:spPr>
       </p:pic>
-      <mc:AlternateContent xmlns:mc="http://schemas.openxmlformats.org/markup-compatibility/2006">
-        <mc:Choice xmlns:p14="http://schemas.microsoft.com/office/powerpoint/2010/main" Requires="p14">
+      <mc:AlternateContent xmlns:mc="http://schemas.openxmlformats.org/markup-compatibility/2006" xmlns:p14="http://schemas.microsoft.com/office/powerpoint/2010/main">
+        <mc:Choice Requires="p14">
           <p:contentPart p14:bwMode="auto" r:id="rId8">
             <p14:nvContentPartPr>
               <p14:cNvPr id="6" name="Entrada de lápiz 5">
@@ -8961,7 +8961,7 @@
             </p14:xfrm>
           </p:contentPart>
         </mc:Choice>
-        <mc:Fallback>
+        <mc:Fallback xmlns="">
           <p:pic>
             <p:nvPicPr>
               <p:cNvPr id="6" name="Entrada de lápiz 5">
@@ -8992,8 +8992,8 @@
           </p:pic>
         </mc:Fallback>
       </mc:AlternateContent>
-      <mc:AlternateContent xmlns:mc="http://schemas.openxmlformats.org/markup-compatibility/2006">
-        <mc:Choice xmlns:p14="http://schemas.microsoft.com/office/powerpoint/2010/main" Requires="p14">
+      <mc:AlternateContent xmlns:mc="http://schemas.openxmlformats.org/markup-compatibility/2006" xmlns:p14="http://schemas.microsoft.com/office/powerpoint/2010/main">
+        <mc:Choice Requires="p14">
           <p:contentPart p14:bwMode="auto" r:id="rId10">
             <p14:nvContentPartPr>
               <p14:cNvPr id="7" name="Entrada de lápiz 6">
@@ -9012,7 +9012,7 @@
             </p14:xfrm>
           </p:contentPart>
         </mc:Choice>
-        <mc:Fallback>
+        <mc:Fallback xmlns="">
           <p:pic>
             <p:nvPicPr>
               <p:cNvPr id="7" name="Entrada de lápiz 6">
@@ -9043,8 +9043,8 @@
           </p:pic>
         </mc:Fallback>
       </mc:AlternateContent>
-      <mc:AlternateContent xmlns:mc="http://schemas.openxmlformats.org/markup-compatibility/2006">
-        <mc:Choice xmlns:p14="http://schemas.microsoft.com/office/powerpoint/2010/main" Requires="p14">
+      <mc:AlternateContent xmlns:mc="http://schemas.openxmlformats.org/markup-compatibility/2006" xmlns:p14="http://schemas.microsoft.com/office/powerpoint/2010/main">
+        <mc:Choice Requires="p14">
           <p:contentPart p14:bwMode="auto" r:id="rId12">
             <p14:nvContentPartPr>
               <p14:cNvPr id="8" name="Entrada de lápiz 7">
@@ -9063,7 +9063,7 @@
             </p14:xfrm>
           </p:contentPart>
         </mc:Choice>
-        <mc:Fallback>
+        <mc:Fallback xmlns="">
           <p:pic>
             <p:nvPicPr>
               <p:cNvPr id="8" name="Entrada de lápiz 7">
@@ -9094,8 +9094,8 @@
           </p:pic>
         </mc:Fallback>
       </mc:AlternateContent>
-      <mc:AlternateContent xmlns:mc="http://schemas.openxmlformats.org/markup-compatibility/2006">
-        <mc:Choice xmlns:p14="http://schemas.microsoft.com/office/powerpoint/2010/main" Requires="p14">
+      <mc:AlternateContent xmlns:mc="http://schemas.openxmlformats.org/markup-compatibility/2006" xmlns:p14="http://schemas.microsoft.com/office/powerpoint/2010/main">
+        <mc:Choice Requires="p14">
           <p:contentPart p14:bwMode="auto" r:id="rId14">
             <p14:nvContentPartPr>
               <p14:cNvPr id="9" name="Entrada de lápiz 8">
@@ -9114,7 +9114,7 @@
             </p14:xfrm>
           </p:contentPart>
         </mc:Choice>
-        <mc:Fallback>
+        <mc:Fallback xmlns="">
           <p:pic>
             <p:nvPicPr>
               <p:cNvPr id="9" name="Entrada de lápiz 8">
@@ -9481,8 +9481,8 @@
           </a:p>
         </p:txBody>
       </p:sp>
-      <mc:AlternateContent xmlns:mc="http://schemas.openxmlformats.org/markup-compatibility/2006">
-        <mc:Choice xmlns:p14="http://schemas.microsoft.com/office/powerpoint/2010/main" Requires="p14">
+      <mc:AlternateContent xmlns:mc="http://schemas.openxmlformats.org/markup-compatibility/2006" xmlns:p14="http://schemas.microsoft.com/office/powerpoint/2010/main">
+        <mc:Choice Requires="p14">
           <p:contentPart p14:bwMode="auto" r:id="rId7">
             <p14:nvContentPartPr>
               <p14:cNvPr id="9" name="Entrada de lápiz 8">
@@ -9501,7 +9501,7 @@
             </p14:xfrm>
           </p:contentPart>
         </mc:Choice>
-        <mc:Fallback>
+        <mc:Fallback xmlns="">
           <p:pic>
             <p:nvPicPr>
               <p:cNvPr id="9" name="Entrada de lápiz 8">
@@ -10001,8 +10001,8 @@
           </a:p>
         </p:txBody>
       </p:sp>
-      <mc:AlternateContent xmlns:mc="http://schemas.openxmlformats.org/markup-compatibility/2006">
-        <mc:Choice xmlns:p14="http://schemas.microsoft.com/office/powerpoint/2010/main" Requires="p14">
+      <mc:AlternateContent xmlns:mc="http://schemas.openxmlformats.org/markup-compatibility/2006" xmlns:p14="http://schemas.microsoft.com/office/powerpoint/2010/main">
+        <mc:Choice Requires="p14">
           <p:contentPart p14:bwMode="auto" r:id="rId7">
             <p14:nvContentPartPr>
               <p14:cNvPr id="9" name="Entrada de lápiz 8">
@@ -10021,7 +10021,7 @@
             </p14:xfrm>
           </p:contentPart>
         </mc:Choice>
-        <mc:Fallback>
+        <mc:Fallback xmlns="">
           <p:pic>
             <p:nvPicPr>
               <p:cNvPr id="9" name="Entrada de lápiz 8">
@@ -10143,10 +10143,10 @@
       </p:grpSpPr>
       <p:pic>
         <p:nvPicPr>
-          <p:cNvPr id="5" name="Imagen 4">
+          <p:cNvPr id="3" name="Imagen 2">
             <a:extLst>
               <a:ext uri="{FF2B5EF4-FFF2-40B4-BE49-F238E27FC236}">
-                <a16:creationId xmlns:a16="http://schemas.microsoft.com/office/drawing/2014/main" id="{32362E28-7AE4-3878-153B-FE519AB20131}"/>
+                <a16:creationId xmlns:a16="http://schemas.microsoft.com/office/drawing/2014/main" id="{DCA30E40-3B88-E73C-B6C1-91747F7696B1}"/>
               </a:ext>
             </a:extLst>
           </p:cNvPr>
@@ -10155,15 +10155,16 @@
           </p:cNvPicPr>
           <p:nvPr/>
         </p:nvPicPr>
-        <p:blipFill rotWithShape="1">
+        <p:blipFill>
           <a:blip r:embed="rId2"/>
-          <a:srcRect l="3551" t="4916" r="6635" b="6390"/>
-          <a:stretch/>
+          <a:stretch>
+            <a:fillRect/>
+          </a:stretch>
         </p:blipFill>
         <p:spPr>
           <a:xfrm>
-            <a:off x="307909" y="905069"/>
-            <a:ext cx="11401815" cy="4870580"/>
+            <a:off x="248689" y="806255"/>
+            <a:ext cx="11446972" cy="5245490"/>
           </a:xfrm>
           <a:prstGeom prst="rect">
             <a:avLst/>
@@ -11180,6 +11181,15 @@
 </file>
 
 <file path=customXml/item1.xml><?xml version="1.0" encoding="utf-8"?>
+<p:properties xmlns:p="http://schemas.microsoft.com/office/2006/metadata/properties" xmlns:xsi="http://www.w3.org/2001/XMLSchema-instance" xmlns:pc="http://schemas.microsoft.com/office/infopath/2007/PartnerControls">
+  <documentManagement>
+    <Status xmlns="71af3243-3dd4-4a8d-8c0d-dd76da1f02a5">Not started</Status>
+    <MediaServiceKeyPoints xmlns="71af3243-3dd4-4a8d-8c0d-dd76da1f02a5" xsi:nil="true"/>
+  </documentManagement>
+</p:properties>
+</file>
+
+<file path=customXml/item2.xml><?xml version="1.0" encoding="utf-8"?>
 <ct:contentTypeSchema xmlns:ct="http://schemas.microsoft.com/office/2006/metadata/contentType" xmlns:ma="http://schemas.microsoft.com/office/2006/metadata/properties/metaAttributes" ct:_="" ma:_="" ma:contentTypeName="Document" ma:contentTypeID="0x01010079F111ED35F8CC479449609E8A0923A6" ma:contentTypeVersion="12" ma:contentTypeDescription="Create a new document." ma:contentTypeScope="" ma:versionID="a410dd7f93c95333ffa1b60ed6adedd1">
   <xsd:schema xmlns:xsd="http://www.w3.org/2001/XMLSchema" xmlns:xs="http://www.w3.org/2001/XMLSchema" xmlns:p="http://schemas.microsoft.com/office/2006/metadata/properties" xmlns:ns2="71af3243-3dd4-4a8d-8c0d-dd76da1f02a5" xmlns:ns3="16c05727-aa75-4e4a-9b5f-8a80a1165891" targetNamespace="http://schemas.microsoft.com/office/2006/metadata/properties" ma:root="true" ma:fieldsID="a936d9baba76aa3866493feff160faab" ns2:_="" ns3:_="">
     <xsd:import namespace="71af3243-3dd4-4a8d-8c0d-dd76da1f02a5"/>
@@ -11400,15 +11410,6 @@
 </ct:contentTypeSchema>
 </file>
 
-<file path=customXml/item2.xml><?xml version="1.0" encoding="utf-8"?>
-<p:properties xmlns:p="http://schemas.microsoft.com/office/2006/metadata/properties" xmlns:xsi="http://www.w3.org/2001/XMLSchema-instance" xmlns:pc="http://schemas.microsoft.com/office/infopath/2007/PartnerControls">
-  <documentManagement>
-    <Status xmlns="71af3243-3dd4-4a8d-8c0d-dd76da1f02a5">Not started</Status>
-    <MediaServiceKeyPoints xmlns="71af3243-3dd4-4a8d-8c0d-dd76da1f02a5" xsi:nil="true"/>
-  </documentManagement>
-</p:properties>
-</file>
-
 <file path=customXml/item3.xml><?xml version="1.0" encoding="utf-8"?>
 <?mso-contentType ?>
 <FormTemplates xmlns="http://schemas.microsoft.com/sharepoint/v3/contenttype/forms">
@@ -11419,6 +11420,16 @@
 </file>
 
 <file path=customXml/itemProps1.xml><?xml version="1.0" encoding="utf-8"?>
+<ds:datastoreItem xmlns:ds="http://schemas.openxmlformats.org/officeDocument/2006/customXml" ds:itemID="{2C4C00F4-06E9-43E3-AD97-88A857CEFA82}">
+  <ds:schemaRefs>
+    <ds:schemaRef ds:uri="http://schemas.microsoft.com/office/2006/metadata/properties"/>
+    <ds:schemaRef ds:uri="http://schemas.microsoft.com/office/infopath/2007/PartnerControls"/>
+    <ds:schemaRef ds:uri="71af3243-3dd4-4a8d-8c0d-dd76da1f02a5"/>
+  </ds:schemaRefs>
+</ds:datastoreItem>
+</file>
+
+<file path=customXml/itemProps2.xml><?xml version="1.0" encoding="utf-8"?>
 <ds:datastoreItem xmlns:ds="http://schemas.openxmlformats.org/officeDocument/2006/customXml" ds:itemID="{0585E981-8C91-4205-A0C3-C991F42B4C9E}">
   <ds:schemaRefs>
     <ds:schemaRef ds:uri="http://schemas.microsoft.com/office/2006/metadata/contentType"/>
@@ -11437,16 +11448,6 @@
 </ds:datastoreItem>
 </file>
 
-<file path=customXml/itemProps2.xml><?xml version="1.0" encoding="utf-8"?>
-<ds:datastoreItem xmlns:ds="http://schemas.openxmlformats.org/officeDocument/2006/customXml" ds:itemID="{2C4C00F4-06E9-43E3-AD97-88A857CEFA82}">
-  <ds:schemaRefs>
-    <ds:schemaRef ds:uri="http://schemas.microsoft.com/office/2006/metadata/properties"/>
-    <ds:schemaRef ds:uri="http://schemas.microsoft.com/office/infopath/2007/PartnerControls"/>
-    <ds:schemaRef ds:uri="71af3243-3dd4-4a8d-8c0d-dd76da1f02a5"/>
-  </ds:schemaRefs>
-</ds:datastoreItem>
-</file>
-
 <file path=customXml/itemProps3.xml><?xml version="1.0" encoding="utf-8"?>
 <ds:datastoreItem xmlns:ds="http://schemas.openxmlformats.org/officeDocument/2006/customXml" ds:itemID="{64B270AB-C138-415C-897E-3C24487DECF1}">
   <ds:schemaRefs>

</xml_diff>